<commit_message>
Java Study 3차 - Spring Project
</commit_message>
<xml_diff>
--- a/Document/[2015.02.25] Java Study 3차 - Spring Project.pptx
+++ b/Document/[2015.02.25] Java Study 3차 - Spring Project.pptx
@@ -3532,15 +3532,7 @@
                 <a:ea typeface="나눔고딕"/>
                 <a:cs typeface="나눔고딕"/>
               </a:rPr>
-              <a:t>1.7.5</a:t>
-            </a:r>
-            <a:r>
-              <a:rPr lang="en-US" altLang="ko-KR" sz="2000" dirty="0" smtClean="0">
-                <a:latin typeface="나눔고딕"/>
-                <a:ea typeface="나눔고딕"/>
-                <a:cs typeface="나눔고딕"/>
-              </a:rPr>
-              <a:t>,</a:t>
+              <a:t>1.7.5,</a:t>
             </a:r>
             <a:r>
               <a:rPr lang="ko-KR" altLang="en-US" sz="2000" dirty="0" smtClean="0">
@@ -4540,11 +4532,6 @@
               </a:rPr>
               <a:t>.</a:t>
             </a:r>
-            <a:endParaRPr lang="en-US" altLang="ko-KR" sz="2000" dirty="0" smtClean="0">
-              <a:latin typeface="나눔고딕"/>
-              <a:ea typeface="나눔고딕"/>
-              <a:cs typeface="나눔고딕"/>
-            </a:endParaRPr>
           </a:p>
           <a:p>
             <a:pPr marL="1257300" lvl="2" indent="-342900" defTabSz="914296" fontAlgn="base">
@@ -4606,7 +4593,15 @@
                 <a:ea typeface="나눔고딕"/>
                 <a:cs typeface="나눔고딕"/>
               </a:rPr>
-              <a:t> --type java-library </a:t>
+              <a:t> --type java-</a:t>
+            </a:r>
+            <a:r>
+              <a:rPr lang="en-US" altLang="ko-KR" sz="2000" dirty="0" smtClean="0">
+                <a:latin typeface="나눔고딕"/>
+                <a:ea typeface="나눔고딕"/>
+                <a:cs typeface="나눔고딕"/>
+              </a:rPr>
+              <a:t>library</a:t>
             </a:r>
           </a:p>
           <a:p>
@@ -4622,20 +4617,28 @@
               <a:defRPr/>
             </a:pPr>
             <a:r>
-              <a:rPr lang="en-US" altLang="ko-KR" sz="2000" dirty="0" err="1">
-                <a:latin typeface="나눔고딕"/>
-                <a:ea typeface="나눔고딕"/>
-                <a:cs typeface="나눔고딕"/>
-              </a:rPr>
-              <a:t>gradle</a:t>
-            </a:r>
-            <a:r>
-              <a:rPr lang="en-US" altLang="ko-KR" sz="2000" dirty="0">
-                <a:latin typeface="나눔고딕"/>
-                <a:ea typeface="나눔고딕"/>
-                <a:cs typeface="나눔고딕"/>
-              </a:rPr>
-              <a:t> check</a:t>
+              <a:rPr lang="en-US" altLang="ko-KR" sz="2000" dirty="0" smtClean="0">
+                <a:latin typeface="나눔고딕"/>
+                <a:ea typeface="나눔고딕"/>
+                <a:cs typeface="나눔고딕"/>
+              </a:rPr>
+              <a:t>copy </a:t>
+            </a:r>
+            <a:r>
+              <a:rPr lang="en-US" altLang="ko-KR" sz="2000" dirty="0" err="1" smtClean="0">
+                <a:latin typeface="나눔고딕"/>
+                <a:ea typeface="나눔고딕"/>
+                <a:cs typeface="나눔고딕"/>
+              </a:rPr>
+              <a:t>build.gradle</a:t>
+            </a:r>
+            <a:r>
+              <a:rPr lang="en-US" altLang="ko-KR" sz="2000" dirty="0" smtClean="0">
+                <a:latin typeface="나눔고딕"/>
+                <a:ea typeface="나눔고딕"/>
+                <a:cs typeface="나눔고딕"/>
+              </a:rPr>
+              <a:t> file</a:t>
             </a:r>
           </a:p>
           <a:p>
@@ -4651,7 +4654,7 @@
               <a:defRPr/>
             </a:pPr>
             <a:r>
-              <a:rPr lang="en-US" altLang="ko-KR" sz="2000" dirty="0" err="1">
+              <a:rPr lang="en-US" altLang="ko-KR" sz="2000" dirty="0" err="1" smtClean="0">
                 <a:latin typeface="나눔고딕"/>
                 <a:ea typeface="나눔고딕"/>
                 <a:cs typeface="나눔고딕"/>
@@ -4659,7 +4662,36 @@
               <a:t>gradle</a:t>
             </a:r>
             <a:r>
-              <a:rPr lang="en-US" altLang="ko-KR" sz="2000" dirty="0">
+              <a:rPr lang="en-US" altLang="ko-KR" sz="2000" dirty="0" smtClean="0">
+                <a:latin typeface="나눔고딕"/>
+                <a:ea typeface="나눔고딕"/>
+                <a:cs typeface="나눔고딕"/>
+              </a:rPr>
+              <a:t> check</a:t>
+            </a:r>
+          </a:p>
+          <a:p>
+            <a:pPr marL="1257300" lvl="2" indent="-342900" defTabSz="914296" fontAlgn="base">
+              <a:spcBef>
+                <a:spcPct val="0"/>
+              </a:spcBef>
+              <a:spcAft>
+                <a:spcPct val="0"/>
+              </a:spcAft>
+              <a:buFont typeface="Wingdings" charset="2"/>
+              <a:buChar char="§"/>
+              <a:defRPr/>
+            </a:pPr>
+            <a:r>
+              <a:rPr lang="en-US" altLang="ko-KR" sz="2000" dirty="0" err="1" smtClean="0">
+                <a:latin typeface="나눔고딕"/>
+                <a:ea typeface="나눔고딕"/>
+                <a:cs typeface="나눔고딕"/>
+              </a:rPr>
+              <a:t>gradle</a:t>
+            </a:r>
+            <a:r>
+              <a:rPr lang="en-US" altLang="ko-KR" sz="2000" dirty="0" smtClean="0">
                 <a:latin typeface="나눔고딕"/>
                 <a:ea typeface="나눔고딕"/>
                 <a:cs typeface="나눔고딕"/>
@@ -4716,6 +4748,24 @@
               </a:rPr>
               <a:t>eclipse</a:t>
             </a:r>
+          </a:p>
+          <a:p>
+            <a:pPr marL="1257300" lvl="2" indent="-342900" defTabSz="914296" fontAlgn="base">
+              <a:spcBef>
+                <a:spcPct val="0"/>
+              </a:spcBef>
+              <a:spcAft>
+                <a:spcPct val="0"/>
+              </a:spcAft>
+              <a:buFont typeface="Wingdings" charset="2"/>
+              <a:buChar char="§"/>
+              <a:defRPr/>
+            </a:pPr>
+            <a:endParaRPr lang="en-US" altLang="ko-KR" sz="2000" smtClean="0">
+              <a:latin typeface="나눔고딕"/>
+              <a:ea typeface="나눔고딕"/>
+              <a:cs typeface="나눔고딕"/>
+            </a:endParaRPr>
           </a:p>
           <a:p>
             <a:pPr marL="1257300" lvl="2" indent="-342900" defTabSz="914296" fontAlgn="base">
@@ -28639,15 +28689,7 @@
                 <a:ea typeface="나눔고딕"/>
                 <a:cs typeface="나눔고딕"/>
               </a:rPr>
-              <a:t>파일 </a:t>
-            </a:r>
-            <a:r>
-              <a:rPr lang="ko-KR" altLang="en-US" sz="2000" dirty="0" smtClean="0">
-                <a:latin typeface="나눔고딕"/>
-                <a:ea typeface="나눔고딕"/>
-                <a:cs typeface="나눔고딕"/>
-              </a:rPr>
-              <a:t>참조</a:t>
+              <a:t>파일 참조</a:t>
             </a:r>
             <a:endParaRPr lang="en-US" altLang="ko-KR" sz="2000" dirty="0" smtClean="0">
               <a:latin typeface="나눔고딕"/>

</xml_diff>